<commit_message>
Update A Primer to Complex Diseases.pptx
</commit_message>
<xml_diff>
--- a/A Primer to Complex Diseases.pptx
+++ b/A Primer to Complex Diseases.pptx
@@ -5,14 +5,20 @@
     <p:sldMasterId id="2147483648" r:id="rId1"/>
   </p:sldMasterIdLst>
   <p:notesMasterIdLst>
-    <p:notesMasterId r:id="rId7"/>
+    <p:notesMasterId r:id="rId13"/>
   </p:notesMasterIdLst>
   <p:sldIdLst>
     <p:sldId id="257" r:id="rId2"/>
     <p:sldId id="258" r:id="rId3"/>
-    <p:sldId id="259" r:id="rId4"/>
-    <p:sldId id="260" r:id="rId5"/>
-    <p:sldId id="261" r:id="rId6"/>
+    <p:sldId id="262" r:id="rId4"/>
+    <p:sldId id="259" r:id="rId5"/>
+    <p:sldId id="260" r:id="rId6"/>
+    <p:sldId id="261" r:id="rId7"/>
+    <p:sldId id="263" r:id="rId8"/>
+    <p:sldId id="264" r:id="rId9"/>
+    <p:sldId id="266" r:id="rId10"/>
+    <p:sldId id="267" r:id="rId11"/>
+    <p:sldId id="268" r:id="rId12"/>
   </p:sldIdLst>
   <p:sldSz cx="12192000" cy="6858000"/>
   <p:notesSz cx="6858000" cy="9144000"/>
@@ -201,7 +207,7 @@
           <a:p>
             <a:fld id="{110DDBF7-0140-4B67-BE05-8361686A7DE1}" type="datetimeFigureOut">
               <a:rPr lang="en-IN" smtClean="0"/>
-              <a:t>31-10-2018</a:t>
+              <a:t>01-11-2018</a:t>
             </a:fld>
             <a:endParaRPr lang="en-IN"/>
           </a:p>
@@ -691,7 +697,7 @@
           <a:p>
             <a:fld id="{63BA3895-3F20-4B0F-B004-3F522BF5E83E}" type="datetimeFigureOut">
               <a:rPr lang="en-IN" smtClean="0"/>
-              <a:t>31-10-2018</a:t>
+              <a:t>01-11-2018</a:t>
             </a:fld>
             <a:endParaRPr lang="en-IN"/>
           </a:p>
@@ -861,7 +867,7 @@
           <a:p>
             <a:fld id="{63BA3895-3F20-4B0F-B004-3F522BF5E83E}" type="datetimeFigureOut">
               <a:rPr lang="en-IN" smtClean="0"/>
-              <a:t>31-10-2018</a:t>
+              <a:t>01-11-2018</a:t>
             </a:fld>
             <a:endParaRPr lang="en-IN"/>
           </a:p>
@@ -1041,7 +1047,7 @@
           <a:p>
             <a:fld id="{63BA3895-3F20-4B0F-B004-3F522BF5E83E}" type="datetimeFigureOut">
               <a:rPr lang="en-IN" smtClean="0"/>
-              <a:t>31-10-2018</a:t>
+              <a:t>01-11-2018</a:t>
             </a:fld>
             <a:endParaRPr lang="en-IN"/>
           </a:p>
@@ -1211,7 +1217,7 @@
           <a:p>
             <a:fld id="{63BA3895-3F20-4B0F-B004-3F522BF5E83E}" type="datetimeFigureOut">
               <a:rPr lang="en-IN" smtClean="0"/>
-              <a:t>31-10-2018</a:t>
+              <a:t>01-11-2018</a:t>
             </a:fld>
             <a:endParaRPr lang="en-IN"/>
           </a:p>
@@ -1457,7 +1463,7 @@
           <a:p>
             <a:fld id="{63BA3895-3F20-4B0F-B004-3F522BF5E83E}" type="datetimeFigureOut">
               <a:rPr lang="en-IN" smtClean="0"/>
-              <a:t>31-10-2018</a:t>
+              <a:t>01-11-2018</a:t>
             </a:fld>
             <a:endParaRPr lang="en-IN"/>
           </a:p>
@@ -1689,7 +1695,7 @@
           <a:p>
             <a:fld id="{63BA3895-3F20-4B0F-B004-3F522BF5E83E}" type="datetimeFigureOut">
               <a:rPr lang="en-IN" smtClean="0"/>
-              <a:t>31-10-2018</a:t>
+              <a:t>01-11-2018</a:t>
             </a:fld>
             <a:endParaRPr lang="en-IN"/>
           </a:p>
@@ -2056,7 +2062,7 @@
           <a:p>
             <a:fld id="{63BA3895-3F20-4B0F-B004-3F522BF5E83E}" type="datetimeFigureOut">
               <a:rPr lang="en-IN" smtClean="0"/>
-              <a:t>31-10-2018</a:t>
+              <a:t>01-11-2018</a:t>
             </a:fld>
             <a:endParaRPr lang="en-IN"/>
           </a:p>
@@ -2174,7 +2180,7 @@
           <a:p>
             <a:fld id="{63BA3895-3F20-4B0F-B004-3F522BF5E83E}" type="datetimeFigureOut">
               <a:rPr lang="en-IN" smtClean="0"/>
-              <a:t>31-10-2018</a:t>
+              <a:t>01-11-2018</a:t>
             </a:fld>
             <a:endParaRPr lang="en-IN"/>
           </a:p>
@@ -2269,7 +2275,7 @@
           <a:p>
             <a:fld id="{63BA3895-3F20-4B0F-B004-3F522BF5E83E}" type="datetimeFigureOut">
               <a:rPr lang="en-IN" smtClean="0"/>
-              <a:t>31-10-2018</a:t>
+              <a:t>01-11-2018</a:t>
             </a:fld>
             <a:endParaRPr lang="en-IN"/>
           </a:p>
@@ -2546,7 +2552,7 @@
           <a:p>
             <a:fld id="{63BA3895-3F20-4B0F-B004-3F522BF5E83E}" type="datetimeFigureOut">
               <a:rPr lang="en-IN" smtClean="0"/>
-              <a:t>31-10-2018</a:t>
+              <a:t>01-11-2018</a:t>
             </a:fld>
             <a:endParaRPr lang="en-IN"/>
           </a:p>
@@ -2799,7 +2805,7 @@
           <a:p>
             <a:fld id="{63BA3895-3F20-4B0F-B004-3F522BF5E83E}" type="datetimeFigureOut">
               <a:rPr lang="en-IN" smtClean="0"/>
-              <a:t>31-10-2018</a:t>
+              <a:t>01-11-2018</a:t>
             </a:fld>
             <a:endParaRPr lang="en-IN"/>
           </a:p>
@@ -3012,7 +3018,7 @@
           <a:p>
             <a:fld id="{63BA3895-3F20-4B0F-B004-3F522BF5E83E}" type="datetimeFigureOut">
               <a:rPr lang="en-IN" smtClean="0"/>
-              <a:t>31-10-2018</a:t>
+              <a:t>01-11-2018</a:t>
             </a:fld>
             <a:endParaRPr lang="en-IN"/>
           </a:p>
@@ -3521,21 +3527,7 @@
                 <a:latin typeface="Arial" panose="020B0604020202020204" pitchFamily="34" charset="0"/>
                 <a:cs typeface="Arial" panose="020B0604020202020204" pitchFamily="34" charset="0"/>
               </a:rPr>
-              <a:t>(As part of seminar course PH893 </a:t>
-            </a:r>
-            <a:r>
-              <a:rPr lang="en-IN" sz="1600" dirty="0" smtClean="0">
-                <a:latin typeface="Arial" panose="020B0604020202020204" pitchFamily="34" charset="0"/>
-                <a:cs typeface="Arial" panose="020B0604020202020204" pitchFamily="34" charset="0"/>
-              </a:rPr>
-              <a:t>during Odd </a:t>
-            </a:r>
-            <a:r>
-              <a:rPr lang="en-IN" sz="1600" dirty="0" smtClean="0">
-                <a:latin typeface="Arial" panose="020B0604020202020204" pitchFamily="34" charset="0"/>
-                <a:cs typeface="Arial" panose="020B0604020202020204" pitchFamily="34" charset="0"/>
-              </a:rPr>
-              <a:t>Semester, 2018)</a:t>
+              <a:t>(As part of seminar course PH893 during Odd Semester, 2018)</a:t>
             </a:r>
           </a:p>
           <a:p>
@@ -3647,6 +3639,226 @@
 </p:sld>
 </file>
 
+<file path=ppt/slides/slide10.xml><?xml version="1.0" encoding="utf-8"?>
+<p:sld xmlns:a="http://schemas.openxmlformats.org/drawingml/2006/main" xmlns:r="http://schemas.openxmlformats.org/officeDocument/2006/relationships" xmlns:p="http://schemas.openxmlformats.org/presentationml/2006/main">
+  <p:cSld>
+    <p:spTree>
+      <p:nvGrpSpPr>
+        <p:cNvPr id="1" name=""/>
+        <p:cNvGrpSpPr/>
+        <p:nvPr/>
+      </p:nvGrpSpPr>
+      <p:grpSpPr>
+        <a:xfrm>
+          <a:off x="0" y="0"/>
+          <a:ext cx="0" cy="0"/>
+          <a:chOff x="0" y="0"/>
+          <a:chExt cx="0" cy="0"/>
+        </a:xfrm>
+      </p:grpSpPr>
+      <p:sp>
+        <p:nvSpPr>
+          <p:cNvPr id="3" name="Title 2"/>
+          <p:cNvSpPr>
+            <a:spLocks noGrp="1"/>
+          </p:cNvSpPr>
+          <p:nvPr>
+            <p:ph type="title"/>
+          </p:nvPr>
+        </p:nvSpPr>
+        <p:spPr/>
+        <p:txBody>
+          <a:bodyPr/>
+          <a:lstStyle/>
+          <a:p>
+            <a:r>
+              <a:rPr lang="en-IN" dirty="0" smtClean="0"/>
+              <a:t>A general statement of the problem</a:t>
+            </a:r>
+            <a:endParaRPr lang="en-IN" dirty="0"/>
+          </a:p>
+        </p:txBody>
+      </p:sp>
+      <p:sp>
+        <p:nvSpPr>
+          <p:cNvPr id="4" name="Content Placeholder 3"/>
+          <p:cNvSpPr>
+            <a:spLocks noGrp="1"/>
+          </p:cNvSpPr>
+          <p:nvPr>
+            <p:ph idx="1"/>
+          </p:nvPr>
+        </p:nvSpPr>
+        <p:spPr/>
+        <p:txBody>
+          <a:bodyPr/>
+          <a:lstStyle/>
+          <a:p>
+            <a:r>
+              <a:rPr lang="en-IN" dirty="0" smtClean="0"/>
+              <a:t>We need to study the structure of the interaction between thousands of genes/proteins/metabolites.</a:t>
+            </a:r>
+          </a:p>
+          <a:p>
+            <a:r>
+              <a:rPr lang="en-IN" dirty="0" smtClean="0"/>
+              <a:t>It is logical to say that these interactions should not be random. Nature should have </a:t>
+            </a:r>
+            <a:r>
+              <a:rPr lang="en-IN" i="1" u="sng" dirty="0" smtClean="0"/>
+              <a:t>OPTIMIZED</a:t>
+            </a:r>
+            <a:r>
+              <a:rPr lang="en-IN" i="1" dirty="0" smtClean="0"/>
+              <a:t> </a:t>
+            </a:r>
+            <a:r>
+              <a:rPr lang="en-IN" dirty="0" smtClean="0"/>
+              <a:t>for something</a:t>
+            </a:r>
+            <a:r>
+              <a:rPr lang="en-IN" i="1" dirty="0" smtClean="0"/>
+              <a:t>. </a:t>
+            </a:r>
+            <a:r>
+              <a:rPr lang="en-IN" dirty="0" smtClean="0"/>
+              <a:t>For instance, for </a:t>
+            </a:r>
+            <a:r>
+              <a:rPr lang="en-IN" i="1" dirty="0" smtClean="0"/>
+              <a:t>robustness </a:t>
+            </a:r>
+            <a:r>
+              <a:rPr lang="en-IN" dirty="0" smtClean="0"/>
+              <a:t>or minimal number of agents in a particular reaction. </a:t>
+            </a:r>
+            <a:r>
+              <a:rPr lang="en-IN" i="1" dirty="0" smtClean="0"/>
+              <a:t> </a:t>
+            </a:r>
+          </a:p>
+          <a:p>
+            <a:r>
+              <a:rPr lang="en-IN" dirty="0" smtClean="0"/>
+              <a:t>So, the general problem – </a:t>
+            </a:r>
+            <a:r>
+              <a:rPr lang="en-IN" b="1" dirty="0" smtClean="0"/>
+              <a:t>How can several agents undergo interactions to get structured in a way to </a:t>
+            </a:r>
+            <a:r>
+              <a:rPr lang="en-IN" b="1" i="1" u="sng" dirty="0" smtClean="0"/>
+              <a:t>OPTIMIZE</a:t>
+            </a:r>
+            <a:r>
+              <a:rPr lang="en-IN" b="1" dirty="0" smtClean="0"/>
+              <a:t> for something?</a:t>
+            </a:r>
+          </a:p>
+          <a:p>
+            <a:r>
+              <a:rPr lang="en-IN" dirty="0" smtClean="0"/>
+              <a:t>Have we encountered such a problem in other contexts? – YES!</a:t>
+            </a:r>
+          </a:p>
+          <a:p>
+            <a:endParaRPr lang="en-IN" i="1" dirty="0"/>
+          </a:p>
+        </p:txBody>
+      </p:sp>
+    </p:spTree>
+    <p:extLst>
+      <p:ext uri="{BB962C8B-B14F-4D97-AF65-F5344CB8AC3E}">
+        <p14:creationId xmlns:p14="http://schemas.microsoft.com/office/powerpoint/2010/main" val="2619326559"/>
+      </p:ext>
+    </p:extLst>
+  </p:cSld>
+  <p:clrMapOvr>
+    <a:masterClrMapping/>
+  </p:clrMapOvr>
+</p:sld>
+</file>
+
+<file path=ppt/slides/slide11.xml><?xml version="1.0" encoding="utf-8"?>
+<p:sld xmlns:a="http://schemas.openxmlformats.org/drawingml/2006/main" xmlns:r="http://schemas.openxmlformats.org/officeDocument/2006/relationships" xmlns:p="http://schemas.openxmlformats.org/presentationml/2006/main">
+  <p:cSld>
+    <p:spTree>
+      <p:nvGrpSpPr>
+        <p:cNvPr id="1" name=""/>
+        <p:cNvGrpSpPr/>
+        <p:nvPr/>
+      </p:nvGrpSpPr>
+      <p:grpSpPr>
+        <a:xfrm>
+          <a:off x="0" y="0"/>
+          <a:ext cx="0" cy="0"/>
+          <a:chOff x="0" y="0"/>
+          <a:chExt cx="0" cy="0"/>
+        </a:xfrm>
+      </p:grpSpPr>
+      <p:sp>
+        <p:nvSpPr>
+          <p:cNvPr id="2" name="Title 1"/>
+          <p:cNvSpPr>
+            <a:spLocks noGrp="1"/>
+          </p:cNvSpPr>
+          <p:nvPr>
+            <p:ph type="title"/>
+          </p:nvPr>
+        </p:nvSpPr>
+        <p:spPr/>
+        <p:txBody>
+          <a:bodyPr/>
+          <a:lstStyle/>
+          <a:p>
+            <a:r>
+              <a:rPr lang="en-IN" dirty="0" smtClean="0"/>
+              <a:t>A Physics problem – The </a:t>
+            </a:r>
+            <a:r>
+              <a:rPr lang="en-IN" dirty="0" err="1" smtClean="0"/>
+              <a:t>Ising</a:t>
+            </a:r>
+            <a:r>
+              <a:rPr lang="en-IN" dirty="0" smtClean="0"/>
+              <a:t> model</a:t>
+            </a:r>
+            <a:endParaRPr lang="en-IN" dirty="0"/>
+          </a:p>
+        </p:txBody>
+      </p:sp>
+      <p:sp>
+        <p:nvSpPr>
+          <p:cNvPr id="3" name="Content Placeholder 2"/>
+          <p:cNvSpPr>
+            <a:spLocks noGrp="1"/>
+          </p:cNvSpPr>
+          <p:nvPr>
+            <p:ph idx="1"/>
+          </p:nvPr>
+        </p:nvSpPr>
+        <p:spPr/>
+        <p:txBody>
+          <a:bodyPr/>
+          <a:lstStyle/>
+          <a:p>
+            <a:endParaRPr lang="en-IN" dirty="0"/>
+          </a:p>
+        </p:txBody>
+      </p:sp>
+    </p:spTree>
+    <p:extLst>
+      <p:ext uri="{BB962C8B-B14F-4D97-AF65-F5344CB8AC3E}">
+        <p14:creationId xmlns:p14="http://schemas.microsoft.com/office/powerpoint/2010/main" val="3492212237"/>
+      </p:ext>
+    </p:extLst>
+  </p:cSld>
+  <p:clrMapOvr>
+    <a:masterClrMapping/>
+  </p:clrMapOvr>
+</p:sld>
+</file>
+
 <file path=ppt/slides/slide2.xml><?xml version="1.0" encoding="utf-8"?>
 <p:sld xmlns:a="http://schemas.openxmlformats.org/drawingml/2006/main" xmlns:r="http://schemas.openxmlformats.org/officeDocument/2006/relationships" xmlns:p="http://schemas.openxmlformats.org/presentationml/2006/main">
   <p:cSld>
@@ -3676,21 +3888,22 @@
         </p:nvSpPr>
         <p:spPr>
           <a:xfrm>
-            <a:off x="845387" y="86263"/>
-            <a:ext cx="10515600" cy="595223"/>
+            <a:off x="948907" y="500331"/>
+            <a:ext cx="10515600" cy="1009292"/>
           </a:xfrm>
         </p:spPr>
         <p:txBody>
           <a:bodyPr>
-            <a:normAutofit fontScale="90000"/>
+            <a:normAutofit/>
           </a:bodyPr>
           <a:lstStyle/>
           <a:p>
-            <a:r>
-              <a:rPr lang="en-IN" b="1" dirty="0" smtClean="0"/>
+            <a:pPr algn="ctr"/>
+            <a:r>
+              <a:rPr lang="en-IN" sz="6000" b="1" dirty="0" smtClean="0"/>
               <a:t>Contents</a:t>
             </a:r>
-            <a:endParaRPr lang="en-IN" b="1" dirty="0"/>
+            <a:endParaRPr lang="en-IN" sz="6000" b="1" dirty="0"/>
           </a:p>
         </p:txBody>
       </p:sp>
@@ -3706,202 +3919,88 @@
         </p:nvSpPr>
         <p:spPr>
           <a:xfrm>
-            <a:off x="3183145" y="681486"/>
-            <a:ext cx="7453225" cy="6021237"/>
+            <a:off x="948907" y="1828800"/>
+            <a:ext cx="9713344" cy="3554084"/>
           </a:xfrm>
         </p:spPr>
         <p:txBody>
           <a:bodyPr>
-            <a:normAutofit fontScale="92500" lnSpcReduction="10000"/>
+            <a:normAutofit/>
           </a:bodyPr>
           <a:lstStyle/>
           <a:p>
-            <a:pPr>
+            <a:pPr marL="742950" indent="-742950">
               <a:lnSpc>
                 <a:spcPct val="110000"/>
               </a:lnSpc>
+              <a:buFont typeface="+mj-lt"/>
+              <a:buAutoNum type="arabicPeriod"/>
             </a:pPr>
             <a:r>
-              <a:rPr lang="en-IN" dirty="0" smtClean="0"/>
+              <a:rPr lang="en-IN" sz="3600" dirty="0" smtClean="0"/>
               <a:t>What is a Complex disease?</a:t>
             </a:r>
           </a:p>
           <a:p>
-            <a:pPr lvl="1">
+            <a:pPr marL="742950" indent="-742950">
               <a:lnSpc>
                 <a:spcPct val="110000"/>
               </a:lnSpc>
+              <a:buFont typeface="+mj-lt"/>
+              <a:buAutoNum type="arabicPeriod"/>
             </a:pPr>
             <a:r>
-              <a:rPr lang="en-IN" dirty="0" smtClean="0"/>
-              <a:t>What is a Complex system?</a:t>
-            </a:r>
-          </a:p>
-          <a:p>
-            <a:pPr lvl="1">
+              <a:rPr lang="en-IN" sz="3600" dirty="0" smtClean="0"/>
+              <a:t>How </a:t>
+            </a:r>
+            <a:r>
+              <a:rPr lang="en-IN" sz="3600" dirty="0" smtClean="0"/>
+              <a:t>to study Complex diseases?</a:t>
+            </a:r>
+          </a:p>
+          <a:p>
+            <a:pPr marL="742950" indent="-742950">
               <a:lnSpc>
                 <a:spcPct val="110000"/>
               </a:lnSpc>
+              <a:buFont typeface="+mj-lt"/>
+              <a:buAutoNum type="arabicPeriod"/>
             </a:pPr>
             <a:r>
-              <a:rPr lang="en-IN" dirty="0" smtClean="0"/>
-              <a:t>Properties of Complex systems</a:t>
-            </a:r>
-          </a:p>
-          <a:p>
-            <a:pPr lvl="1">
-              <a:lnSpc>
-                <a:spcPct val="110000"/>
-              </a:lnSpc>
-            </a:pPr>
-            <a:r>
-              <a:rPr lang="en-IN" dirty="0" smtClean="0"/>
-              <a:t>What is a Complex disease?</a:t>
-            </a:r>
-          </a:p>
-          <a:p>
-            <a:pPr lvl="1">
-              <a:lnSpc>
-                <a:spcPct val="110000"/>
-              </a:lnSpc>
-            </a:pPr>
-            <a:r>
-              <a:rPr lang="en-IN" dirty="0" smtClean="0"/>
-              <a:t>Complex disease as a Complex System</a:t>
-            </a:r>
-          </a:p>
-          <a:p>
-            <a:pPr>
-              <a:lnSpc>
-                <a:spcPct val="110000"/>
-              </a:lnSpc>
-            </a:pPr>
-            <a:r>
-              <a:rPr lang="en-IN" dirty="0" smtClean="0"/>
-              <a:t>How to study Complex diseases?</a:t>
-            </a:r>
-          </a:p>
-          <a:p>
-            <a:pPr lvl="1">
-              <a:lnSpc>
-                <a:spcPct val="110000"/>
-              </a:lnSpc>
-            </a:pPr>
-            <a:r>
-              <a:rPr lang="en-IN" dirty="0" smtClean="0"/>
-              <a:t>A general statement of the problem</a:t>
-            </a:r>
-          </a:p>
-          <a:p>
-            <a:pPr lvl="1">
-              <a:lnSpc>
-                <a:spcPct val="110000"/>
-              </a:lnSpc>
-            </a:pPr>
-            <a:r>
-              <a:rPr lang="en-IN" dirty="0" smtClean="0"/>
-              <a:t>A Physics problem – The </a:t>
-            </a:r>
-            <a:r>
-              <a:rPr lang="en-IN" dirty="0" err="1" smtClean="0"/>
-              <a:t>Ising</a:t>
-            </a:r>
-            <a:r>
-              <a:rPr lang="en-IN" dirty="0" smtClean="0"/>
-              <a:t> model</a:t>
-            </a:r>
-          </a:p>
-          <a:p>
-            <a:pPr lvl="1">
-              <a:lnSpc>
-                <a:spcPct val="110000"/>
-              </a:lnSpc>
-            </a:pPr>
-            <a:r>
-              <a:rPr lang="en-IN" dirty="0" smtClean="0"/>
-              <a:t>Combinatorial optimization requires Graphs</a:t>
-            </a:r>
-          </a:p>
-          <a:p>
-            <a:pPr lvl="1">
-              <a:lnSpc>
-                <a:spcPct val="110000"/>
-              </a:lnSpc>
-            </a:pPr>
-            <a:r>
-              <a:rPr lang="en-IN" dirty="0" smtClean="0"/>
-              <a:t>The answer – Complex Networks</a:t>
-            </a:r>
-          </a:p>
-          <a:p>
-            <a:pPr>
-              <a:lnSpc>
-                <a:spcPct val="110000"/>
-              </a:lnSpc>
-            </a:pPr>
-            <a:r>
-              <a:rPr lang="en-IN" dirty="0" smtClean="0"/>
-              <a:t>What can we ai</a:t>
-            </a:r>
-            <a:r>
-              <a:rPr lang="en-IN" dirty="0"/>
+              <a:rPr lang="en-IN" sz="3600" dirty="0" smtClean="0"/>
+              <a:t>What </a:t>
+            </a:r>
+            <a:r>
+              <a:rPr lang="en-IN" sz="3600" dirty="0" smtClean="0"/>
+              <a:t>can we ai</a:t>
+            </a:r>
+            <a:r>
+              <a:rPr lang="en-IN" sz="3600" dirty="0"/>
               <a:t>m</a:t>
             </a:r>
             <a:r>
-              <a:rPr lang="en-IN" dirty="0" smtClean="0"/>
-              <a:t> to study with Complex Networks?</a:t>
-            </a:r>
-          </a:p>
-          <a:p>
-            <a:pPr lvl="1">
-              <a:lnSpc>
-                <a:spcPct val="110000"/>
-              </a:lnSpc>
-            </a:pPr>
-            <a:r>
-              <a:rPr lang="en-IN" dirty="0" smtClean="0"/>
-              <a:t>Measures that matter</a:t>
-            </a:r>
-          </a:p>
-          <a:p>
-            <a:pPr lvl="1">
-              <a:lnSpc>
-                <a:spcPct val="110000"/>
-              </a:lnSpc>
-            </a:pPr>
-            <a:r>
-              <a:rPr lang="en-IN" dirty="0" smtClean="0"/>
-              <a:t>Large scale structure </a:t>
-            </a:r>
-          </a:p>
-          <a:p>
-            <a:pPr lvl="1">
-              <a:lnSpc>
-                <a:spcPct val="110000"/>
-              </a:lnSpc>
-            </a:pPr>
-            <a:r>
-              <a:rPr lang="en-IN" dirty="0" smtClean="0"/>
-              <a:t>Dynamics and other behaviour</a:t>
-            </a:r>
+              <a:rPr lang="en-IN" sz="3600" dirty="0" smtClean="0"/>
+              <a:t> to study with Complex Networks</a:t>
+            </a:r>
+            <a:r>
+              <a:rPr lang="en-IN" sz="3600" dirty="0" smtClean="0"/>
+              <a:t>?</a:t>
+            </a:r>
+            <a:endParaRPr lang="en-IN" sz="3600" dirty="0" smtClean="0"/>
+          </a:p>
+          <a:p>
+            <a:endParaRPr lang="en-IN" sz="3600" dirty="0" smtClean="0"/>
+          </a:p>
+          <a:p>
+            <a:endParaRPr lang="en-IN" sz="3600" dirty="0" smtClean="0"/>
           </a:p>
           <a:p>
             <a:pPr lvl="1"/>
-            <a:endParaRPr lang="en-IN" dirty="0" smtClean="0"/>
-          </a:p>
-          <a:p>
-            <a:endParaRPr lang="en-IN" dirty="0" smtClean="0"/>
-          </a:p>
-          <a:p>
-            <a:endParaRPr lang="en-IN" dirty="0" smtClean="0"/>
+            <a:endParaRPr lang="en-IN" sz="3200" dirty="0" smtClean="0"/>
           </a:p>
           <a:p>
             <a:pPr lvl="1"/>
-            <a:endParaRPr lang="en-IN" dirty="0" smtClean="0"/>
-          </a:p>
-          <a:p>
-            <a:pPr lvl="1"/>
-            <a:endParaRPr lang="en-IN" dirty="0"/>
+            <a:endParaRPr lang="en-IN" sz="3200" dirty="0"/>
           </a:p>
         </p:txBody>
       </p:sp>
@@ -3937,7 +4036,7 @@
       </p:grpSpPr>
       <p:sp>
         <p:nvSpPr>
-          <p:cNvPr id="2" name="Title 1"/>
+          <p:cNvPr id="4" name="Title 3"/>
           <p:cNvSpPr>
             <a:spLocks noGrp="1"/>
           </p:cNvSpPr>
@@ -3947,8 +4046,8 @@
         </p:nvSpPr>
         <p:spPr>
           <a:xfrm>
-            <a:off x="838200" y="94666"/>
-            <a:ext cx="10515600" cy="741873"/>
+            <a:off x="820947" y="2763269"/>
+            <a:ext cx="10515600" cy="1325563"/>
           </a:xfrm>
         </p:spPr>
         <p:txBody>
@@ -3959,193 +4058,17 @@
           <a:p>
             <a:pPr algn="ctr"/>
             <a:r>
-              <a:rPr lang="en-IN" sz="4000" dirty="0" smtClean="0"/>
-              <a:t>What is a Complex System?</a:t>
-            </a:r>
-            <a:endParaRPr lang="en-IN" sz="4000" dirty="0"/>
-          </a:p>
-        </p:txBody>
-      </p:sp>
-      <p:sp>
-        <p:nvSpPr>
-          <p:cNvPr id="4" name="Content Placeholder 3"/>
-          <p:cNvSpPr>
-            <a:spLocks noGrp="1"/>
-          </p:cNvSpPr>
-          <p:nvPr>
-            <p:ph sz="half" idx="1"/>
-          </p:nvPr>
-        </p:nvSpPr>
-        <p:spPr>
-          <a:xfrm>
-            <a:off x="232913" y="836652"/>
-            <a:ext cx="5279366" cy="5496036"/>
-          </a:xfrm>
-        </p:spPr>
-        <p:txBody>
-          <a:bodyPr>
-            <a:noAutofit/>
-          </a:bodyPr>
-          <a:lstStyle/>
-          <a:p>
-            <a:pPr marL="0" indent="0">
-              <a:lnSpc>
-                <a:spcPct val="150000"/>
-              </a:lnSpc>
-              <a:buNone/>
-            </a:pPr>
-            <a:r>
-              <a:rPr lang="en-IN" sz="2400" dirty="0" smtClean="0"/>
-              <a:t>“Complex </a:t>
-            </a:r>
-            <a:r>
-              <a:rPr lang="en-IN" sz="2400" dirty="0"/>
-              <a:t>systems are networks made of a number of components that interact </a:t>
-            </a:r>
-            <a:r>
-              <a:rPr lang="en-IN" sz="2400" dirty="0" smtClean="0"/>
-              <a:t>with each </a:t>
-            </a:r>
-            <a:r>
-              <a:rPr lang="en-IN" sz="2400" dirty="0"/>
-              <a:t>other, typically in a nonlinear fashion. Complex systems may arise and </a:t>
-            </a:r>
-            <a:r>
-              <a:rPr lang="en-IN" sz="2400" dirty="0" smtClean="0"/>
-              <a:t>evolve through </a:t>
-            </a:r>
-            <a:r>
-              <a:rPr lang="en-IN" sz="2400" dirty="0"/>
-              <a:t>self-organization, such that they are neither completely regular nor </a:t>
-            </a:r>
-            <a:r>
-              <a:rPr lang="en-IN" sz="2400" dirty="0" smtClean="0"/>
-              <a:t>completely random</a:t>
-            </a:r>
-            <a:r>
-              <a:rPr lang="en-IN" sz="2400" dirty="0"/>
-              <a:t>, permitting the development of emergent </a:t>
-            </a:r>
-            <a:r>
-              <a:rPr lang="en-IN" sz="2400" dirty="0" smtClean="0"/>
-              <a:t>behaviour </a:t>
-            </a:r>
-            <a:r>
-              <a:rPr lang="en-IN" sz="2400" dirty="0"/>
-              <a:t>at </a:t>
-            </a:r>
-            <a:r>
-              <a:rPr lang="en-IN" sz="2400" dirty="0" smtClean="0"/>
-              <a:t>macroscopic scales.”</a:t>
-            </a:r>
-            <a:r>
-              <a:rPr lang="en-IN" sz="2400" baseline="30000" dirty="0" smtClean="0"/>
-              <a:t>1</a:t>
-            </a:r>
-            <a:endParaRPr lang="en-IN" sz="2400" baseline="30000" dirty="0"/>
-          </a:p>
-        </p:txBody>
-      </p:sp>
-      <p:pic>
-        <p:nvPicPr>
-          <p:cNvPr id="8" name="Content Placeholder 7"/>
-          <p:cNvPicPr>
-            <a:picLocks noGrp="1" noChangeAspect="1"/>
-          </p:cNvPicPr>
-          <p:nvPr>
-            <p:ph sz="half" idx="2"/>
-          </p:nvPr>
-        </p:nvPicPr>
-        <p:blipFill>
-          <a:blip r:embed="rId2">
-            <a:extLst>
-              <a:ext uri="{28A0092B-C50C-407E-A947-70E740481C1C}">
-                <a14:useLocalDpi xmlns:a14="http://schemas.microsoft.com/office/drawing/2010/main" val="0"/>
-              </a:ext>
-            </a:extLst>
-          </a:blip>
-          <a:stretch>
-            <a:fillRect/>
-          </a:stretch>
-        </p:blipFill>
-        <p:spPr>
-          <a:xfrm>
-            <a:off x="5667554" y="914401"/>
-            <a:ext cx="5686245" cy="5262564"/>
-          </a:xfrm>
-        </p:spPr>
-      </p:pic>
-      <p:sp>
-        <p:nvSpPr>
-          <p:cNvPr id="7" name="TextBox 6"/>
-          <p:cNvSpPr txBox="1"/>
-          <p:nvPr/>
-        </p:nvSpPr>
-        <p:spPr>
-          <a:xfrm>
-            <a:off x="232913" y="6176965"/>
-            <a:ext cx="4546121" cy="369332"/>
-          </a:xfrm>
-          <a:prstGeom prst="rect">
-            <a:avLst/>
-          </a:prstGeom>
-          <a:noFill/>
-        </p:spPr>
-        <p:txBody>
-          <a:bodyPr wrap="square" rtlCol="0">
-            <a:spAutoFit/>
-          </a:bodyPr>
-          <a:lstStyle/>
-          <a:p>
-            <a:r>
-              <a:rPr lang="en-IN" dirty="0" smtClean="0"/>
-              <a:t>1,2.  </a:t>
-            </a:r>
-          </a:p>
-        </p:txBody>
-      </p:sp>
-      <p:sp>
-        <p:nvSpPr>
-          <p:cNvPr id="9" name="TextBox 8"/>
-          <p:cNvSpPr txBox="1"/>
-          <p:nvPr/>
-        </p:nvSpPr>
-        <p:spPr>
-          <a:xfrm>
-            <a:off x="6449682" y="6254827"/>
-            <a:ext cx="4546121" cy="369332"/>
-          </a:xfrm>
-          <a:prstGeom prst="rect">
-            <a:avLst/>
-          </a:prstGeom>
-          <a:noFill/>
-        </p:spPr>
-        <p:txBody>
-          <a:bodyPr wrap="square" rtlCol="0">
-            <a:spAutoFit/>
-          </a:bodyPr>
-          <a:lstStyle/>
-          <a:p>
-            <a:pPr algn="ctr"/>
-            <a:r>
-              <a:rPr lang="en-IN" dirty="0" smtClean="0"/>
-              <a:t>Fig 1. Concept map of Complex systems</a:t>
-            </a:r>
-            <a:r>
-              <a:rPr lang="en-IN" baseline="30000" dirty="0" smtClean="0"/>
-              <a:t>2</a:t>
-            </a:r>
-            <a:r>
-              <a:rPr lang="en-IN" dirty="0" smtClean="0"/>
-              <a:t> </a:t>
-            </a:r>
+              <a:rPr lang="en-IN" sz="5400" b="1" dirty="0" smtClean="0"/>
+              <a:t>1. What is a Complex Disease?</a:t>
+            </a:r>
+            <a:endParaRPr lang="en-IN" sz="5400" b="1" dirty="0"/>
           </a:p>
         </p:txBody>
       </p:sp>
     </p:spTree>
     <p:extLst>
       <p:ext uri="{BB962C8B-B14F-4D97-AF65-F5344CB8AC3E}">
-        <p14:creationId xmlns:p14="http://schemas.microsoft.com/office/powerpoint/2010/main" val="2856631511"/>
+        <p14:creationId xmlns:p14="http://schemas.microsoft.com/office/powerpoint/2010/main" val="2719189537"/>
       </p:ext>
     </p:extLst>
   </p:cSld>
@@ -4174,77 +4097,254 @@
       </p:grpSpPr>
       <p:sp>
         <p:nvSpPr>
-          <p:cNvPr id="8" name="Content Placeholder 7"/>
-          <p:cNvSpPr>
-            <a:spLocks noGrp="1"/>
-          </p:cNvSpPr>
-          <p:nvPr>
-            <p:ph idx="1"/>
-          </p:nvPr>
-        </p:nvSpPr>
-        <p:spPr/>
-        <p:txBody>
-          <a:bodyPr/>
-          <a:lstStyle/>
-          <a:p>
-            <a:endParaRPr lang="en-IN" dirty="0"/>
-          </a:p>
-        </p:txBody>
-      </p:sp>
-      <p:sp>
-        <p:nvSpPr>
-          <p:cNvPr id="5" name="Title 1"/>
-          <p:cNvSpPr txBox="1">
-            <a:spLocks/>
-          </p:cNvSpPr>
-          <p:nvPr/>
+          <p:cNvPr id="2" name="Title 1"/>
+          <p:cNvSpPr>
+            <a:spLocks noGrp="1"/>
+          </p:cNvSpPr>
+          <p:nvPr>
+            <p:ph type="title"/>
+          </p:nvPr>
         </p:nvSpPr>
         <p:spPr>
           <a:xfrm>
-            <a:off x="838200" y="353458"/>
+            <a:off x="838200" y="94666"/>
             <a:ext cx="10515600" cy="741873"/>
+          </a:xfrm>
+        </p:spPr>
+        <p:txBody>
+          <a:bodyPr>
+            <a:normAutofit/>
+          </a:bodyPr>
+          <a:lstStyle/>
+          <a:p>
+            <a:pPr algn="ctr"/>
+            <a:r>
+              <a:rPr lang="en-IN" sz="4000" dirty="0" smtClean="0"/>
+              <a:t>What is a Complex System?</a:t>
+            </a:r>
+            <a:endParaRPr lang="en-IN" sz="4000" dirty="0"/>
+          </a:p>
+        </p:txBody>
+      </p:sp>
+      <p:sp>
+        <p:nvSpPr>
+          <p:cNvPr id="4" name="Content Placeholder 3"/>
+          <p:cNvSpPr>
+            <a:spLocks noGrp="1"/>
+          </p:cNvSpPr>
+          <p:nvPr>
+            <p:ph sz="half" idx="1"/>
+          </p:nvPr>
+        </p:nvSpPr>
+        <p:spPr>
+          <a:xfrm>
+            <a:off x="232913" y="836652"/>
+            <a:ext cx="5279366" cy="5496036"/>
+          </a:xfrm>
+        </p:spPr>
+        <p:txBody>
+          <a:bodyPr>
+            <a:noAutofit/>
+          </a:bodyPr>
+          <a:lstStyle/>
+          <a:p>
+            <a:pPr marL="0" indent="0">
+              <a:lnSpc>
+                <a:spcPct val="150000"/>
+              </a:lnSpc>
+              <a:buNone/>
+            </a:pPr>
+            <a:r>
+              <a:rPr lang="en-IN" sz="2400" dirty="0" smtClean="0"/>
+              <a:t>“Complex </a:t>
+            </a:r>
+            <a:r>
+              <a:rPr lang="en-IN" sz="2400" dirty="0"/>
+              <a:t>systems are networks made of a number of components that interact </a:t>
+            </a:r>
+            <a:r>
+              <a:rPr lang="en-IN" sz="2400" dirty="0" smtClean="0"/>
+              <a:t>with each </a:t>
+            </a:r>
+            <a:r>
+              <a:rPr lang="en-IN" sz="2400" dirty="0"/>
+              <a:t>other, typically in a nonlinear fashion. Complex systems may arise and </a:t>
+            </a:r>
+            <a:r>
+              <a:rPr lang="en-IN" sz="2400" dirty="0" smtClean="0"/>
+              <a:t>evolve through </a:t>
+            </a:r>
+            <a:r>
+              <a:rPr lang="en-IN" sz="2400" dirty="0"/>
+              <a:t>self-organization, such that they are neither completely regular nor </a:t>
+            </a:r>
+            <a:r>
+              <a:rPr lang="en-IN" sz="2400" dirty="0" smtClean="0"/>
+              <a:t>completely random</a:t>
+            </a:r>
+            <a:r>
+              <a:rPr lang="en-IN" sz="2400" dirty="0"/>
+              <a:t>, permitting the development of emergent </a:t>
+            </a:r>
+            <a:r>
+              <a:rPr lang="en-IN" sz="2400" dirty="0" smtClean="0"/>
+              <a:t>behaviour </a:t>
+            </a:r>
+            <a:r>
+              <a:rPr lang="en-IN" sz="2400" dirty="0"/>
+              <a:t>at </a:t>
+            </a:r>
+            <a:r>
+              <a:rPr lang="en-IN" sz="2400" dirty="0" smtClean="0"/>
+              <a:t>macroscopic scales.”</a:t>
+            </a:r>
+            <a:r>
+              <a:rPr lang="en-IN" sz="2400" baseline="30000" dirty="0" smtClean="0"/>
+              <a:t>1*</a:t>
+            </a:r>
+            <a:endParaRPr lang="en-IN" sz="2400" baseline="30000" dirty="0"/>
+          </a:p>
+        </p:txBody>
+      </p:sp>
+      <p:pic>
+        <p:nvPicPr>
+          <p:cNvPr id="8" name="Content Placeholder 7"/>
+          <p:cNvPicPr>
+            <a:picLocks noGrp="1" noChangeAspect="1"/>
+          </p:cNvPicPr>
+          <p:nvPr>
+            <p:ph sz="half" idx="2"/>
+          </p:nvPr>
+        </p:nvPicPr>
+        <p:blipFill>
+          <a:blip r:embed="rId2">
+            <a:extLst>
+              <a:ext uri="{28A0092B-C50C-407E-A947-70E740481C1C}">
+                <a14:useLocalDpi xmlns:a14="http://schemas.microsoft.com/office/drawing/2010/main" val="0"/>
+              </a:ext>
+            </a:extLst>
+          </a:blip>
+          <a:stretch>
+            <a:fillRect/>
+          </a:stretch>
+        </p:blipFill>
+        <p:spPr>
+          <a:xfrm>
+            <a:off x="5667554" y="914401"/>
+            <a:ext cx="5686245" cy="5262564"/>
+          </a:xfrm>
+        </p:spPr>
+      </p:pic>
+      <p:sp>
+        <p:nvSpPr>
+          <p:cNvPr id="7" name="TextBox 6"/>
+          <p:cNvSpPr txBox="1"/>
+          <p:nvPr/>
+        </p:nvSpPr>
+        <p:spPr>
+          <a:xfrm>
+            <a:off x="232913" y="6176965"/>
+            <a:ext cx="4546121" cy="369332"/>
           </a:xfrm>
           <a:prstGeom prst="rect">
             <a:avLst/>
           </a:prstGeom>
+          <a:noFill/>
         </p:spPr>
         <p:txBody>
-          <a:bodyPr vert="horz" lIns="91440" tIns="45720" rIns="91440" bIns="45720" rtlCol="0" anchor="ctr">
-            <a:normAutofit/>
+          <a:bodyPr wrap="square" rtlCol="0">
+            <a:spAutoFit/>
           </a:bodyPr>
-          <a:lstStyle>
-            <a:lvl1pPr algn="l" defTabSz="914400" rtl="0" eaLnBrk="1" latinLnBrk="0" hangingPunct="1">
-              <a:lnSpc>
-                <a:spcPct val="90000"/>
-              </a:lnSpc>
-              <a:spcBef>
-                <a:spcPct val="0"/>
-              </a:spcBef>
-              <a:buNone/>
-              <a:defRPr sz="4400" kern="1200">
-                <a:solidFill>
-                  <a:schemeClr val="tx1"/>
-                </a:solidFill>
-                <a:latin typeface="+mj-lt"/>
-                <a:ea typeface="+mj-ea"/>
-                <a:cs typeface="+mj-cs"/>
-              </a:defRPr>
-            </a:lvl1pPr>
-          </a:lstStyle>
+          <a:lstStyle/>
+          <a:p>
+            <a:r>
+              <a:rPr lang="en-IN" dirty="0" smtClean="0"/>
+              <a:t>1,2. </a:t>
+            </a:r>
+            <a:r>
+              <a:rPr lang="en-IN" dirty="0" smtClean="0"/>
+              <a:t> </a:t>
+            </a:r>
+            <a:endParaRPr lang="en-IN" dirty="0" smtClean="0"/>
+          </a:p>
+        </p:txBody>
+      </p:sp>
+      <p:sp>
+        <p:nvSpPr>
+          <p:cNvPr id="9" name="TextBox 8"/>
+          <p:cNvSpPr txBox="1"/>
+          <p:nvPr/>
+        </p:nvSpPr>
+        <p:spPr>
+          <a:xfrm>
+            <a:off x="6449682" y="6254827"/>
+            <a:ext cx="4546121" cy="369332"/>
+          </a:xfrm>
+          <a:prstGeom prst="rect">
+            <a:avLst/>
+          </a:prstGeom>
+          <a:noFill/>
+        </p:spPr>
+        <p:txBody>
+          <a:bodyPr wrap="square" rtlCol="0">
+            <a:spAutoFit/>
+          </a:bodyPr>
+          <a:lstStyle/>
           <a:p>
             <a:pPr algn="ctr"/>
             <a:r>
-              <a:rPr lang="en-IN" sz="4000" dirty="0" smtClean="0"/>
-              <a:t>Properties of Complex systems</a:t>
-            </a:r>
-            <a:endParaRPr lang="en-IN" sz="4000" dirty="0"/>
+              <a:rPr lang="en-IN" dirty="0" smtClean="0"/>
+              <a:t>Fig 1. Concept map of Complex systems</a:t>
+            </a:r>
+            <a:r>
+              <a:rPr lang="en-IN" baseline="30000" dirty="0" smtClean="0"/>
+              <a:t>2</a:t>
+            </a:r>
+            <a:r>
+              <a:rPr lang="en-IN" dirty="0" smtClean="0"/>
+              <a:t> </a:t>
+            </a:r>
+          </a:p>
+        </p:txBody>
+      </p:sp>
+      <p:sp>
+        <p:nvSpPr>
+          <p:cNvPr id="10" name="TextBox 9"/>
+          <p:cNvSpPr txBox="1"/>
+          <p:nvPr/>
+        </p:nvSpPr>
+        <p:spPr>
+          <a:xfrm>
+            <a:off x="232912" y="5807520"/>
+            <a:ext cx="4546121" cy="369332"/>
+          </a:xfrm>
+          <a:prstGeom prst="rect">
+            <a:avLst/>
+          </a:prstGeom>
+          <a:noFill/>
+        </p:spPr>
+        <p:txBody>
+          <a:bodyPr wrap="square" rtlCol="0">
+            <a:spAutoFit/>
+          </a:bodyPr>
+          <a:lstStyle/>
+          <a:p>
+            <a:r>
+              <a:rPr lang="en-IN" sz="1400" dirty="0" smtClean="0"/>
+              <a:t>*Not a definition. That would be reductionist!</a:t>
+            </a:r>
+            <a:r>
+              <a:rPr lang="en-IN" dirty="0" smtClean="0"/>
+              <a:t>  </a:t>
+            </a:r>
+            <a:endParaRPr lang="en-IN" dirty="0" smtClean="0"/>
           </a:p>
         </p:txBody>
       </p:sp>
     </p:spTree>
     <p:extLst>
       <p:ext uri="{BB962C8B-B14F-4D97-AF65-F5344CB8AC3E}">
-        <p14:creationId xmlns:p14="http://schemas.microsoft.com/office/powerpoint/2010/main" val="1103520123"/>
+        <p14:creationId xmlns:p14="http://schemas.microsoft.com/office/powerpoint/2010/main" val="2856631511"/>
       </p:ext>
     </p:extLst>
   </p:cSld>
@@ -4273,6 +4373,183 @@
       </p:grpSpPr>
       <p:sp>
         <p:nvSpPr>
+          <p:cNvPr id="8" name="Content Placeholder 7"/>
+          <p:cNvSpPr>
+            <a:spLocks noGrp="1"/>
+          </p:cNvSpPr>
+          <p:nvPr>
+            <p:ph idx="1"/>
+          </p:nvPr>
+        </p:nvSpPr>
+        <p:spPr>
+          <a:xfrm>
+            <a:off x="838200" y="1708029"/>
+            <a:ext cx="10515600" cy="4675967"/>
+          </a:xfrm>
+        </p:spPr>
+        <p:txBody>
+          <a:bodyPr/>
+          <a:lstStyle/>
+          <a:p>
+            <a:r>
+              <a:rPr lang="en-IN" dirty="0" smtClean="0"/>
+              <a:t>They have a large number of agents that can be considered simple.</a:t>
+            </a:r>
+          </a:p>
+          <a:p>
+            <a:pPr lvl="1"/>
+            <a:r>
+              <a:rPr lang="en-IN" dirty="0" smtClean="0"/>
+              <a:t>Like ant colonies</a:t>
+            </a:r>
+          </a:p>
+          <a:p>
+            <a:r>
+              <a:rPr lang="en-IN" dirty="0" smtClean="0"/>
+              <a:t>The interactions are non linear</a:t>
+            </a:r>
+          </a:p>
+          <a:p>
+            <a:pPr lvl="1"/>
+            <a:r>
+              <a:rPr lang="en-IN" dirty="0" smtClean="0"/>
+              <a:t>The whole is not the sum of the parts.</a:t>
+            </a:r>
+          </a:p>
+          <a:p>
+            <a:r>
+              <a:rPr lang="en-IN" dirty="0" smtClean="0"/>
+              <a:t>They show emergent behaviour.</a:t>
+            </a:r>
+          </a:p>
+          <a:p>
+            <a:pPr lvl="1"/>
+            <a:r>
+              <a:rPr lang="en-IN" dirty="0" smtClean="0"/>
+              <a:t>There is a hierarchical organization.</a:t>
+            </a:r>
+          </a:p>
+          <a:p>
+            <a:r>
+              <a:rPr lang="en-IN" dirty="0" smtClean="0"/>
+              <a:t>They are self organizing.</a:t>
+            </a:r>
+          </a:p>
+          <a:p>
+            <a:pPr lvl="1"/>
+            <a:r>
+              <a:rPr lang="en-IN" dirty="0" smtClean="0"/>
+              <a:t>No agent is the leader</a:t>
+            </a:r>
+          </a:p>
+          <a:p>
+            <a:r>
+              <a:rPr lang="en-IN" dirty="0" smtClean="0"/>
+              <a:t>They can be modelled as networks.</a:t>
+            </a:r>
+          </a:p>
+          <a:p>
+            <a:pPr lvl="1"/>
+            <a:r>
+              <a:rPr lang="en-IN" dirty="0" smtClean="0"/>
+              <a:t>More on this later</a:t>
+            </a:r>
+          </a:p>
+          <a:p>
+            <a:endParaRPr lang="en-IN" dirty="0" smtClean="0"/>
+          </a:p>
+          <a:p>
+            <a:pPr lvl="1"/>
+            <a:endParaRPr lang="en-IN" dirty="0"/>
+          </a:p>
+        </p:txBody>
+      </p:sp>
+      <p:sp>
+        <p:nvSpPr>
+          <p:cNvPr id="5" name="Title 1"/>
+          <p:cNvSpPr txBox="1">
+            <a:spLocks/>
+          </p:cNvSpPr>
+          <p:nvPr/>
+        </p:nvSpPr>
+        <p:spPr>
+          <a:xfrm>
+            <a:off x="838200" y="534613"/>
+            <a:ext cx="10515600" cy="741873"/>
+          </a:xfrm>
+          <a:prstGeom prst="rect">
+            <a:avLst/>
+          </a:prstGeom>
+        </p:spPr>
+        <p:txBody>
+          <a:bodyPr vert="horz" lIns="91440" tIns="45720" rIns="91440" bIns="45720" rtlCol="0" anchor="ctr">
+            <a:normAutofit/>
+          </a:bodyPr>
+          <a:lstStyle>
+            <a:lvl1pPr algn="l" defTabSz="914400" rtl="0" eaLnBrk="1" latinLnBrk="0" hangingPunct="1">
+              <a:lnSpc>
+                <a:spcPct val="90000"/>
+              </a:lnSpc>
+              <a:spcBef>
+                <a:spcPct val="0"/>
+              </a:spcBef>
+              <a:buNone/>
+              <a:defRPr sz="4400" kern="1200">
+                <a:solidFill>
+                  <a:schemeClr val="tx1"/>
+                </a:solidFill>
+                <a:latin typeface="+mj-lt"/>
+                <a:ea typeface="+mj-ea"/>
+                <a:cs typeface="+mj-cs"/>
+              </a:defRPr>
+            </a:lvl1pPr>
+          </a:lstStyle>
+          <a:p>
+            <a:pPr algn="ctr"/>
+            <a:r>
+              <a:rPr lang="en-IN" sz="4000" dirty="0" smtClean="0"/>
+              <a:t>General properties </a:t>
+            </a:r>
+            <a:r>
+              <a:rPr lang="en-IN" sz="4000" dirty="0" smtClean="0"/>
+              <a:t>of Complex systems</a:t>
+            </a:r>
+            <a:endParaRPr lang="en-IN" sz="4000" dirty="0"/>
+          </a:p>
+        </p:txBody>
+      </p:sp>
+    </p:spTree>
+    <p:extLst>
+      <p:ext uri="{BB962C8B-B14F-4D97-AF65-F5344CB8AC3E}">
+        <p14:creationId xmlns:p14="http://schemas.microsoft.com/office/powerpoint/2010/main" val="1103520123"/>
+      </p:ext>
+    </p:extLst>
+  </p:cSld>
+  <p:clrMapOvr>
+    <a:masterClrMapping/>
+  </p:clrMapOvr>
+</p:sld>
+</file>
+
+<file path=ppt/slides/slide6.xml><?xml version="1.0" encoding="utf-8"?>
+<p:sld xmlns:a="http://schemas.openxmlformats.org/drawingml/2006/main" xmlns:r="http://schemas.openxmlformats.org/officeDocument/2006/relationships" xmlns:p="http://schemas.openxmlformats.org/presentationml/2006/main">
+  <p:cSld>
+    <p:spTree>
+      <p:nvGrpSpPr>
+        <p:cNvPr id="1" name=""/>
+        <p:cNvGrpSpPr/>
+        <p:nvPr/>
+      </p:nvGrpSpPr>
+      <p:grpSpPr>
+        <a:xfrm>
+          <a:off x="0" y="0"/>
+          <a:ext cx="0" cy="0"/>
+          <a:chOff x="0" y="0"/>
+          <a:chExt cx="0" cy="0"/>
+        </a:xfrm>
+      </p:grpSpPr>
+      <p:sp>
+        <p:nvSpPr>
           <p:cNvPr id="2" name="Title 1"/>
           <p:cNvSpPr>
             <a:spLocks noGrp="1"/>
@@ -4305,12 +4582,101 @@
             <p:ph idx="1"/>
           </p:nvPr>
         </p:nvSpPr>
-        <p:spPr/>
-        <p:txBody>
-          <a:bodyPr/>
-          <a:lstStyle/>
-          <a:p>
-            <a:endParaRPr lang="en-IN"/>
+        <p:spPr>
+          <a:xfrm>
+            <a:off x="406879" y="1825625"/>
+            <a:ext cx="11378241" cy="4808088"/>
+          </a:xfrm>
+        </p:spPr>
+        <p:txBody>
+          <a:bodyPr>
+            <a:normAutofit/>
+          </a:bodyPr>
+          <a:lstStyle/>
+          <a:p>
+            <a:r>
+              <a:rPr lang="en-IN" dirty="0" smtClean="0"/>
+              <a:t>It is a type of complex system.</a:t>
+            </a:r>
+          </a:p>
+          <a:p>
+            <a:r>
+              <a:rPr lang="en-IN" sz="3200" dirty="0" smtClean="0"/>
+              <a:t>“…complex diseases [are those that] </a:t>
+            </a:r>
+            <a:r>
+              <a:rPr lang="en-IN" sz="3200" dirty="0"/>
+              <a:t>arise as a consequence of the combined effect of </a:t>
+            </a:r>
+            <a:r>
+              <a:rPr lang="en-IN" sz="3200" i="1" u="sng" dirty="0"/>
+              <a:t>multiple genetic determinants, which may vary between individuals</a:t>
+            </a:r>
+            <a:r>
+              <a:rPr lang="en-IN" sz="3200" dirty="0"/>
+              <a:t>, and environmental </a:t>
+            </a:r>
+            <a:r>
+              <a:rPr lang="en-IN" sz="3200" dirty="0" smtClean="0"/>
+              <a:t>factors and wherein </a:t>
+            </a:r>
+            <a:r>
+              <a:rPr lang="en-IN" sz="3200" dirty="0"/>
+              <a:t>the </a:t>
+            </a:r>
+            <a:r>
+              <a:rPr lang="en-IN" sz="3200" i="1" u="sng" dirty="0"/>
+              <a:t>phenotype cannot be easily predicted from the genotype</a:t>
+            </a:r>
+            <a:r>
+              <a:rPr lang="en-IN" sz="3200" dirty="0"/>
+              <a:t>. This is proposed to be due to the </a:t>
+            </a:r>
+            <a:r>
+              <a:rPr lang="en-IN" sz="3200" i="1" u="sng" dirty="0"/>
+              <a:t>interaction between genes</a:t>
+            </a:r>
+            <a:r>
+              <a:rPr lang="en-IN" sz="3200" u="sng" dirty="0"/>
+              <a:t> (epistasis</a:t>
+            </a:r>
+            <a:r>
+              <a:rPr lang="en-IN" sz="3200" u="sng" dirty="0" smtClean="0"/>
+              <a:t>)</a:t>
+            </a:r>
+            <a:r>
+              <a:rPr lang="en-IN" sz="3200" dirty="0" smtClean="0"/>
+              <a:t>, </a:t>
+            </a:r>
+            <a:r>
+              <a:rPr lang="en-IN" sz="3200" dirty="0"/>
+              <a:t>modulation by </a:t>
+            </a:r>
+            <a:r>
+              <a:rPr lang="en-IN" sz="3200" dirty="0" smtClean="0"/>
+              <a:t>environmental </a:t>
+            </a:r>
+            <a:r>
+              <a:rPr lang="en-IN" sz="3200" dirty="0"/>
+              <a:t>factors or stochastic </a:t>
+            </a:r>
+            <a:r>
+              <a:rPr lang="en-IN" sz="3200" dirty="0" smtClean="0"/>
+              <a:t>processes, </a:t>
+            </a:r>
+            <a:r>
+              <a:rPr lang="en-IN" sz="3200" dirty="0"/>
+              <a:t>or epigenetic </a:t>
+            </a:r>
+            <a:r>
+              <a:rPr lang="en-IN" sz="3200" dirty="0" smtClean="0"/>
+              <a:t>changes.”</a:t>
+            </a:r>
+            <a:r>
+              <a:rPr lang="en-IN" sz="3200" baseline="30000" dirty="0" smtClean="0"/>
+              <a:t>3</a:t>
+            </a:r>
+            <a:endParaRPr lang="en-IN" sz="3200" baseline="30000" dirty="0"/>
           </a:p>
         </p:txBody>
       </p:sp>
@@ -4318,6 +4684,279 @@
     <p:extLst>
       <p:ext uri="{BB962C8B-B14F-4D97-AF65-F5344CB8AC3E}">
         <p14:creationId xmlns:p14="http://schemas.microsoft.com/office/powerpoint/2010/main" val="554839221"/>
+      </p:ext>
+    </p:extLst>
+  </p:cSld>
+  <p:clrMapOvr>
+    <a:masterClrMapping/>
+  </p:clrMapOvr>
+</p:sld>
+</file>
+
+<file path=ppt/slides/slide7.xml><?xml version="1.0" encoding="utf-8"?>
+<p:sld xmlns:a="http://schemas.openxmlformats.org/drawingml/2006/main" xmlns:r="http://schemas.openxmlformats.org/officeDocument/2006/relationships" xmlns:p="http://schemas.openxmlformats.org/presentationml/2006/main">
+  <p:cSld>
+    <p:spTree>
+      <p:nvGrpSpPr>
+        <p:cNvPr id="1" name=""/>
+        <p:cNvGrpSpPr/>
+        <p:nvPr/>
+      </p:nvGrpSpPr>
+      <p:grpSpPr>
+        <a:xfrm>
+          <a:off x="0" y="0"/>
+          <a:ext cx="0" cy="0"/>
+          <a:chOff x="0" y="0"/>
+          <a:chExt cx="0" cy="0"/>
+        </a:xfrm>
+      </p:grpSpPr>
+      <p:sp>
+        <p:nvSpPr>
+          <p:cNvPr id="2" name="Title 1"/>
+          <p:cNvSpPr>
+            <a:spLocks noGrp="1"/>
+          </p:cNvSpPr>
+          <p:nvPr>
+            <p:ph type="title"/>
+          </p:nvPr>
+        </p:nvSpPr>
+        <p:spPr/>
+        <p:txBody>
+          <a:bodyPr/>
+          <a:lstStyle/>
+          <a:p>
+            <a:pPr algn="ctr"/>
+            <a:r>
+              <a:rPr lang="en-IN" dirty="0" smtClean="0"/>
+              <a:t>Complex diseases as Complex Systems</a:t>
+            </a:r>
+            <a:endParaRPr lang="en-IN" dirty="0"/>
+          </a:p>
+        </p:txBody>
+      </p:sp>
+      <p:sp>
+        <p:nvSpPr>
+          <p:cNvPr id="3" name="Content Placeholder 2"/>
+          <p:cNvSpPr>
+            <a:spLocks noGrp="1"/>
+          </p:cNvSpPr>
+          <p:nvPr>
+            <p:ph idx="1"/>
+          </p:nvPr>
+        </p:nvSpPr>
+        <p:spPr>
+          <a:xfrm>
+            <a:off x="483079" y="1825625"/>
+            <a:ext cx="10870721" cy="4351338"/>
+          </a:xfrm>
+        </p:spPr>
+        <p:txBody>
+          <a:bodyPr/>
+          <a:lstStyle/>
+          <a:p>
+            <a:r>
+              <a:rPr lang="en-IN" dirty="0" smtClean="0"/>
+              <a:t>Agents – Thousands of Genes or Proteins or Metabolites </a:t>
+            </a:r>
+          </a:p>
+          <a:p>
+            <a:r>
+              <a:rPr lang="en-IN" dirty="0" smtClean="0"/>
+              <a:t>These genes or proteins interact chemically or physically, non linearly. </a:t>
+            </a:r>
+          </a:p>
+          <a:p>
+            <a:r>
+              <a:rPr lang="en-IN" dirty="0" smtClean="0"/>
+              <a:t>From the </a:t>
+            </a:r>
+            <a:r>
+              <a:rPr lang="en-IN" i="1" u="sng" dirty="0" smtClean="0"/>
+              <a:t>Central Dogma of Molecular Biology</a:t>
+            </a:r>
+            <a:r>
+              <a:rPr lang="en-IN" dirty="0" smtClean="0"/>
+              <a:t>, we know that, mutations in the DNA sequence affect the genes which affects RNA which in turn affects the protein which in turn causes a phenotype(symptoms of the disease). Thus there is emergent behaviour(Hierarchical structure). </a:t>
+            </a:r>
+          </a:p>
+          <a:p>
+            <a:r>
+              <a:rPr lang="en-IN" dirty="0" smtClean="0"/>
+              <a:t>There is no one central gene that causes the disease. It is the result of complex interaction between multiple genes. Thus it is self organizing.</a:t>
+            </a:r>
+          </a:p>
+          <a:p>
+            <a:endParaRPr lang="en-IN" dirty="0" smtClean="0"/>
+          </a:p>
+          <a:p>
+            <a:endParaRPr lang="en-IN" dirty="0"/>
+          </a:p>
+        </p:txBody>
+      </p:sp>
+    </p:spTree>
+    <p:extLst>
+      <p:ext uri="{BB962C8B-B14F-4D97-AF65-F5344CB8AC3E}">
+        <p14:creationId xmlns:p14="http://schemas.microsoft.com/office/powerpoint/2010/main" val="3971184101"/>
+      </p:ext>
+    </p:extLst>
+  </p:cSld>
+  <p:clrMapOvr>
+    <a:masterClrMapping/>
+  </p:clrMapOvr>
+</p:sld>
+</file>
+
+<file path=ppt/slides/slide8.xml><?xml version="1.0" encoding="utf-8"?>
+<p:sld xmlns:a="http://schemas.openxmlformats.org/drawingml/2006/main" xmlns:r="http://schemas.openxmlformats.org/officeDocument/2006/relationships" xmlns:p="http://schemas.openxmlformats.org/presentationml/2006/main">
+  <p:cSld>
+    <p:spTree>
+      <p:nvGrpSpPr>
+        <p:cNvPr id="1" name=""/>
+        <p:cNvGrpSpPr/>
+        <p:nvPr/>
+      </p:nvGrpSpPr>
+      <p:grpSpPr>
+        <a:xfrm>
+          <a:off x="0" y="0"/>
+          <a:ext cx="0" cy="0"/>
+          <a:chOff x="0" y="0"/>
+          <a:chExt cx="0" cy="0"/>
+        </a:xfrm>
+      </p:grpSpPr>
+      <p:sp>
+        <p:nvSpPr>
+          <p:cNvPr id="4" name="Title 3"/>
+          <p:cNvSpPr>
+            <a:spLocks noGrp="1"/>
+          </p:cNvSpPr>
+          <p:nvPr>
+            <p:ph type="title"/>
+          </p:nvPr>
+        </p:nvSpPr>
+        <p:spPr>
+          <a:xfrm>
+            <a:off x="846827" y="805073"/>
+            <a:ext cx="10515600" cy="3266595"/>
+          </a:xfrm>
+        </p:spPr>
+        <p:txBody>
+          <a:bodyPr>
+            <a:normAutofit/>
+          </a:bodyPr>
+          <a:lstStyle/>
+          <a:p>
+            <a:pPr algn="ctr"/>
+            <a:r>
+              <a:rPr lang="en-IN" dirty="0" smtClean="0"/>
+              <a:t>So, what is a Complex disease?</a:t>
+            </a:r>
+            <a:br>
+              <a:rPr lang="en-IN" dirty="0" smtClean="0"/>
+            </a:br>
+            <a:r>
+              <a:rPr lang="en-IN" dirty="0" smtClean="0"/>
+              <a:t>A type of Complex system with thousands of genes/proteins/metabolites interacting non linearly causing an undesirable phenotype. </a:t>
+            </a:r>
+            <a:endParaRPr lang="en-IN" dirty="0"/>
+          </a:p>
+        </p:txBody>
+      </p:sp>
+      <p:sp>
+        <p:nvSpPr>
+          <p:cNvPr id="5" name="TextBox 4"/>
+          <p:cNvSpPr txBox="1"/>
+          <p:nvPr/>
+        </p:nvSpPr>
+        <p:spPr>
+          <a:xfrm>
+            <a:off x="3027872" y="4373592"/>
+            <a:ext cx="6452558" cy="954107"/>
+          </a:xfrm>
+          <a:prstGeom prst="rect">
+            <a:avLst/>
+          </a:prstGeom>
+          <a:noFill/>
+        </p:spPr>
+        <p:txBody>
+          <a:bodyPr wrap="square" rtlCol="0">
+            <a:spAutoFit/>
+          </a:bodyPr>
+          <a:lstStyle/>
+          <a:p>
+            <a:pPr algn="ctr"/>
+            <a:r>
+              <a:rPr lang="en-IN" sz="2800" dirty="0" smtClean="0"/>
+              <a:t>Any questions at this point? Please feel free to ask.</a:t>
+            </a:r>
+            <a:endParaRPr lang="en-IN" sz="2800" dirty="0"/>
+          </a:p>
+        </p:txBody>
+      </p:sp>
+    </p:spTree>
+    <p:extLst>
+      <p:ext uri="{BB962C8B-B14F-4D97-AF65-F5344CB8AC3E}">
+        <p14:creationId xmlns:p14="http://schemas.microsoft.com/office/powerpoint/2010/main" val="3803179467"/>
+      </p:ext>
+    </p:extLst>
+  </p:cSld>
+  <p:clrMapOvr>
+    <a:masterClrMapping/>
+  </p:clrMapOvr>
+</p:sld>
+</file>
+
+<file path=ppt/slides/slide9.xml><?xml version="1.0" encoding="utf-8"?>
+<p:sld xmlns:a="http://schemas.openxmlformats.org/drawingml/2006/main" xmlns:r="http://schemas.openxmlformats.org/officeDocument/2006/relationships" xmlns:p="http://schemas.openxmlformats.org/presentationml/2006/main">
+  <p:cSld>
+    <p:spTree>
+      <p:nvGrpSpPr>
+        <p:cNvPr id="1" name=""/>
+        <p:cNvGrpSpPr/>
+        <p:nvPr/>
+      </p:nvGrpSpPr>
+      <p:grpSpPr>
+        <a:xfrm>
+          <a:off x="0" y="0"/>
+          <a:ext cx="0" cy="0"/>
+          <a:chOff x="0" y="0"/>
+          <a:chExt cx="0" cy="0"/>
+        </a:xfrm>
+      </p:grpSpPr>
+      <p:sp>
+        <p:nvSpPr>
+          <p:cNvPr id="4" name="Title 3"/>
+          <p:cNvSpPr>
+            <a:spLocks noGrp="1"/>
+          </p:cNvSpPr>
+          <p:nvPr>
+            <p:ph type="title"/>
+          </p:nvPr>
+        </p:nvSpPr>
+        <p:spPr>
+          <a:xfrm>
+            <a:off x="820947" y="2763269"/>
+            <a:ext cx="10515600" cy="1325563"/>
+          </a:xfrm>
+        </p:spPr>
+        <p:txBody>
+          <a:bodyPr>
+            <a:normAutofit/>
+          </a:bodyPr>
+          <a:lstStyle/>
+          <a:p>
+            <a:pPr algn="ctr"/>
+            <a:r>
+              <a:rPr lang="en-IN" sz="5400" b="1" dirty="0" smtClean="0"/>
+              <a:t>2. How to study Complex Diseases?</a:t>
+            </a:r>
+            <a:endParaRPr lang="en-IN" sz="5400" b="1" dirty="0"/>
+          </a:p>
+        </p:txBody>
+      </p:sp>
+    </p:spTree>
+    <p:extLst>
+      <p:ext uri="{BB962C8B-B14F-4D97-AF65-F5344CB8AC3E}">
+        <p14:creationId xmlns:p14="http://schemas.microsoft.com/office/powerpoint/2010/main" val="3882505176"/>
       </p:ext>
     </p:extLst>
   </p:cSld>

</xml_diff>